<commit_message>
Add Huffman tree diagrams and related images
Added DOT, SVG, and PNG files for Huffman tree visualizations for Problem 1-3, including spread and high-resolution variants. Updated presentation file and added new SVG diagrams for improved documentation and illustration.
</commit_message>
<xml_diff>
--- a/Image_Processing_Engineering/work2/レポート課題2_問題1作業用.pptx
+++ b/Image_Processing_Engineering/work2/レポート課題2_問題1作業用.pptx
@@ -8,6 +8,7 @@
     <p:sldId id="256" r:id="rId5"/>
     <p:sldId id="257" r:id="rId6"/>
     <p:sldId id="258" r:id="rId7"/>
+    <p:sldId id="259" r:id="rId8"/>
   </p:sldIdLst>
   <p:sldSz cx="12192000" cy="6858000"/>
   <p:notesSz cx="6858000" cy="9144000"/>
@@ -272,7 +273,7 @@
           <a:p>
             <a:fld id="{5C9C0D60-8195-4E0A-868B-B34A5024ECB5}" type="datetimeFigureOut">
               <a:rPr kumimoji="1" lang="ja-JP" altLang="en-US" smtClean="0"/>
-              <a:t>2026/1/9</a:t>
+              <a:t>2026/1/11</a:t>
             </a:fld>
             <a:endParaRPr kumimoji="1" lang="ja-JP" altLang="en-US"/>
           </a:p>
@@ -502,7 +503,7 @@
           <a:p>
             <a:fld id="{5C9C0D60-8195-4E0A-868B-B34A5024ECB5}" type="datetimeFigureOut">
               <a:rPr kumimoji="1" lang="ja-JP" altLang="en-US" smtClean="0"/>
-              <a:t>2026/1/9</a:t>
+              <a:t>2026/1/11</a:t>
             </a:fld>
             <a:endParaRPr kumimoji="1" lang="ja-JP" altLang="en-US"/>
           </a:p>
@@ -742,7 +743,7 @@
           <a:p>
             <a:fld id="{5C9C0D60-8195-4E0A-868B-B34A5024ECB5}" type="datetimeFigureOut">
               <a:rPr kumimoji="1" lang="ja-JP" altLang="en-US" smtClean="0"/>
-              <a:t>2026/1/9</a:t>
+              <a:t>2026/1/11</a:t>
             </a:fld>
             <a:endParaRPr kumimoji="1" lang="ja-JP" altLang="en-US"/>
           </a:p>
@@ -972,7 +973,7 @@
           <a:p>
             <a:fld id="{5C9C0D60-8195-4E0A-868B-B34A5024ECB5}" type="datetimeFigureOut">
               <a:rPr kumimoji="1" lang="ja-JP" altLang="en-US" smtClean="0"/>
-              <a:t>2026/1/9</a:t>
+              <a:t>2026/1/11</a:t>
             </a:fld>
             <a:endParaRPr kumimoji="1" lang="ja-JP" altLang="en-US"/>
           </a:p>
@@ -1247,7 +1248,7 @@
           <a:p>
             <a:fld id="{5C9C0D60-8195-4E0A-868B-B34A5024ECB5}" type="datetimeFigureOut">
               <a:rPr kumimoji="1" lang="ja-JP" altLang="en-US" smtClean="0"/>
-              <a:t>2026/1/9</a:t>
+              <a:t>2026/1/11</a:t>
             </a:fld>
             <a:endParaRPr kumimoji="1" lang="ja-JP" altLang="en-US"/>
           </a:p>
@@ -1576,7 +1577,7 @@
           <a:p>
             <a:fld id="{5C9C0D60-8195-4E0A-868B-B34A5024ECB5}" type="datetimeFigureOut">
               <a:rPr kumimoji="1" lang="ja-JP" altLang="en-US" smtClean="0"/>
-              <a:t>2026/1/9</a:t>
+              <a:t>2026/1/11</a:t>
             </a:fld>
             <a:endParaRPr kumimoji="1" lang="ja-JP" altLang="en-US"/>
           </a:p>
@@ -2052,7 +2053,7 @@
           <a:p>
             <a:fld id="{5C9C0D60-8195-4E0A-868B-B34A5024ECB5}" type="datetimeFigureOut">
               <a:rPr kumimoji="1" lang="ja-JP" altLang="en-US" smtClean="0"/>
-              <a:t>2026/1/9</a:t>
+              <a:t>2026/1/11</a:t>
             </a:fld>
             <a:endParaRPr kumimoji="1" lang="ja-JP" altLang="en-US"/>
           </a:p>
@@ -2193,7 +2194,7 @@
           <a:p>
             <a:fld id="{5C9C0D60-8195-4E0A-868B-B34A5024ECB5}" type="datetimeFigureOut">
               <a:rPr kumimoji="1" lang="ja-JP" altLang="en-US" smtClean="0"/>
-              <a:t>2026/1/9</a:t>
+              <a:t>2026/1/11</a:t>
             </a:fld>
             <a:endParaRPr kumimoji="1" lang="ja-JP" altLang="en-US"/>
           </a:p>
@@ -2306,7 +2307,7 @@
           <a:p>
             <a:fld id="{5C9C0D60-8195-4E0A-868B-B34A5024ECB5}" type="datetimeFigureOut">
               <a:rPr kumimoji="1" lang="ja-JP" altLang="en-US" smtClean="0"/>
-              <a:t>2026/1/9</a:t>
+              <a:t>2026/1/11</a:t>
             </a:fld>
             <a:endParaRPr kumimoji="1" lang="ja-JP" altLang="en-US"/>
           </a:p>
@@ -2649,7 +2650,7 @@
           <a:p>
             <a:fld id="{5C9C0D60-8195-4E0A-868B-B34A5024ECB5}" type="datetimeFigureOut">
               <a:rPr kumimoji="1" lang="ja-JP" altLang="en-US" smtClean="0"/>
-              <a:t>2026/1/9</a:t>
+              <a:t>2026/1/11</a:t>
             </a:fld>
             <a:endParaRPr kumimoji="1" lang="ja-JP" altLang="en-US"/>
           </a:p>
@@ -2937,7 +2938,7 @@
           <a:p>
             <a:fld id="{5C9C0D60-8195-4E0A-868B-B34A5024ECB5}" type="datetimeFigureOut">
               <a:rPr kumimoji="1" lang="ja-JP" altLang="en-US" smtClean="0"/>
-              <a:t>2026/1/9</a:t>
+              <a:t>2026/1/11</a:t>
             </a:fld>
             <a:endParaRPr kumimoji="1" lang="ja-JP" altLang="en-US"/>
           </a:p>
@@ -3210,7 +3211,7 @@
           <a:p>
             <a:fld id="{5C9C0D60-8195-4E0A-868B-B34A5024ECB5}" type="datetimeFigureOut">
               <a:rPr kumimoji="1" lang="ja-JP" altLang="en-US" smtClean="0"/>
-              <a:t>2026/1/9</a:t>
+              <a:t>2026/1/11</a:t>
             </a:fld>
             <a:endParaRPr kumimoji="1" lang="ja-JP" altLang="en-US"/>
           </a:p>
@@ -38761,6 +38762,572 @@
 </p:sld>
 </file>
 
+<file path=ppt/slides/slide4.xml><?xml version="1.0" encoding="utf-8"?>
+<p:sld xmlns:a="http://schemas.openxmlformats.org/drawingml/2006/main" xmlns:r="http://schemas.openxmlformats.org/officeDocument/2006/relationships" xmlns:p="http://schemas.openxmlformats.org/presentationml/2006/main">
+  <p:cSld>
+    <p:spTree>
+      <p:nvGrpSpPr>
+        <p:cNvPr id="1" name=""/>
+        <p:cNvGrpSpPr/>
+        <p:nvPr/>
+      </p:nvGrpSpPr>
+      <p:grpSpPr>
+        <a:xfrm>
+          <a:off x="0" y="0"/>
+          <a:ext cx="0" cy="0"/>
+          <a:chOff x="0" y="0"/>
+          <a:chExt cx="0" cy="0"/>
+        </a:xfrm>
+      </p:grpSpPr>
+      <p:sp>
+        <p:nvSpPr>
+          <p:cNvPr id="3" name="フローチャート: 処理 2">
+            <a:extLst>
+              <a:ext uri="{FF2B5EF4-FFF2-40B4-BE49-F238E27FC236}">
+                <a16:creationId xmlns:a16="http://schemas.microsoft.com/office/drawing/2014/main" id="{7CCD3096-D468-7EBA-2E99-162C2311F55D}"/>
+              </a:ext>
+            </a:extLst>
+          </p:cNvPr>
+          <p:cNvSpPr/>
+          <p:nvPr/>
+        </p:nvSpPr>
+        <p:spPr>
+          <a:xfrm>
+            <a:off x="0" y="6488668"/>
+            <a:ext cx="1326684" cy="369332"/>
+          </a:xfrm>
+          <a:prstGeom prst="flowChartProcess">
+            <a:avLst/>
+          </a:prstGeom>
+          <a:noFill/>
+          <a:ln>
+            <a:solidFill>
+              <a:schemeClr val="tx1"/>
+            </a:solidFill>
+          </a:ln>
+        </p:spPr>
+        <p:style>
+          <a:lnRef idx="2">
+            <a:schemeClr val="accent1">
+              <a:shade val="15000"/>
+            </a:schemeClr>
+          </a:lnRef>
+          <a:fillRef idx="1">
+            <a:schemeClr val="accent1"/>
+          </a:fillRef>
+          <a:effectRef idx="0">
+            <a:schemeClr val="accent1"/>
+          </a:effectRef>
+          <a:fontRef idx="minor">
+            <a:schemeClr val="lt1"/>
+          </a:fontRef>
+        </p:style>
+        <p:txBody>
+          <a:bodyPr wrap="square" rtlCol="0" anchor="ctr">
+            <a:spAutoFit/>
+          </a:bodyPr>
+          <a:lstStyle/>
+          <a:p>
+            <a:pPr algn="ctr"/>
+            <a:r>
+              <a:rPr kumimoji="1" lang="en-US" altLang="ja-JP" dirty="0">
+                <a:solidFill>
+                  <a:schemeClr val="tx1"/>
+                </a:solidFill>
+              </a:rPr>
+              <a:t>4 (1)</a:t>
+            </a:r>
+            <a:endParaRPr kumimoji="1" lang="ja-JP" altLang="en-US" dirty="0">
+              <a:solidFill>
+                <a:schemeClr val="tx1"/>
+              </a:solidFill>
+            </a:endParaRPr>
+          </a:p>
+        </p:txBody>
+      </p:sp>
+      <p:sp>
+        <p:nvSpPr>
+          <p:cNvPr id="4" name="フローチャート: 処理 3">
+            <a:extLst>
+              <a:ext uri="{FF2B5EF4-FFF2-40B4-BE49-F238E27FC236}">
+                <a16:creationId xmlns:a16="http://schemas.microsoft.com/office/drawing/2014/main" id="{D903ED05-7283-D727-42B2-8CE3C2CF7B09}"/>
+              </a:ext>
+            </a:extLst>
+          </p:cNvPr>
+          <p:cNvSpPr/>
+          <p:nvPr/>
+        </p:nvSpPr>
+        <p:spPr>
+          <a:xfrm>
+            <a:off x="1867302" y="6488668"/>
+            <a:ext cx="1326684" cy="369332"/>
+          </a:xfrm>
+          <a:prstGeom prst="flowChartProcess">
+            <a:avLst/>
+          </a:prstGeom>
+          <a:noFill/>
+          <a:ln>
+            <a:solidFill>
+              <a:schemeClr val="tx1"/>
+            </a:solidFill>
+          </a:ln>
+        </p:spPr>
+        <p:style>
+          <a:lnRef idx="2">
+            <a:schemeClr val="accent1">
+              <a:shade val="15000"/>
+            </a:schemeClr>
+          </a:lnRef>
+          <a:fillRef idx="1">
+            <a:schemeClr val="accent1"/>
+          </a:fillRef>
+          <a:effectRef idx="0">
+            <a:schemeClr val="accent1"/>
+          </a:effectRef>
+          <a:fontRef idx="minor">
+            <a:schemeClr val="lt1"/>
+          </a:fontRef>
+        </p:style>
+        <p:txBody>
+          <a:bodyPr wrap="square" rtlCol="0" anchor="ctr">
+            <a:spAutoFit/>
+          </a:bodyPr>
+          <a:lstStyle/>
+          <a:p>
+            <a:pPr algn="ctr"/>
+            <a:r>
+              <a:rPr kumimoji="1" lang="en-US" altLang="ja-JP" dirty="0">
+                <a:solidFill>
+                  <a:schemeClr val="tx1"/>
+                </a:solidFill>
+              </a:rPr>
+              <a:t>1 (2)</a:t>
+            </a:r>
+            <a:endParaRPr kumimoji="1" lang="ja-JP" altLang="en-US" dirty="0">
+              <a:solidFill>
+                <a:schemeClr val="tx1"/>
+              </a:solidFill>
+            </a:endParaRPr>
+          </a:p>
+        </p:txBody>
+      </p:sp>
+      <p:sp>
+        <p:nvSpPr>
+          <p:cNvPr id="5" name="フローチャート: 処理 4">
+            <a:extLst>
+              <a:ext uri="{FF2B5EF4-FFF2-40B4-BE49-F238E27FC236}">
+                <a16:creationId xmlns:a16="http://schemas.microsoft.com/office/drawing/2014/main" id="{91B860FF-404B-9B4A-FDA3-90316948E01D}"/>
+              </a:ext>
+            </a:extLst>
+          </p:cNvPr>
+          <p:cNvSpPr/>
+          <p:nvPr/>
+        </p:nvSpPr>
+        <p:spPr>
+          <a:xfrm>
+            <a:off x="745154" y="5006377"/>
+            <a:ext cx="1326684" cy="369332"/>
+          </a:xfrm>
+          <a:prstGeom prst="flowChartProcess">
+            <a:avLst/>
+          </a:prstGeom>
+          <a:noFill/>
+          <a:ln>
+            <a:solidFill>
+              <a:schemeClr val="tx1"/>
+            </a:solidFill>
+          </a:ln>
+        </p:spPr>
+        <p:style>
+          <a:lnRef idx="2">
+            <a:schemeClr val="accent1">
+              <a:shade val="15000"/>
+            </a:schemeClr>
+          </a:lnRef>
+          <a:fillRef idx="1">
+            <a:schemeClr val="accent1"/>
+          </a:fillRef>
+          <a:effectRef idx="0">
+            <a:schemeClr val="accent1"/>
+          </a:effectRef>
+          <a:fontRef idx="minor">
+            <a:schemeClr val="lt1"/>
+          </a:fontRef>
+        </p:style>
+        <p:txBody>
+          <a:bodyPr wrap="square" rtlCol="0" anchor="ctr">
+            <a:spAutoFit/>
+          </a:bodyPr>
+          <a:lstStyle/>
+          <a:p>
+            <a:pPr algn="ctr"/>
+            <a:r>
+              <a:rPr kumimoji="1" lang="en-US" altLang="ja-JP" dirty="0">
+                <a:solidFill>
+                  <a:schemeClr val="tx1"/>
+                </a:solidFill>
+              </a:rPr>
+              <a:t>1</a:t>
+            </a:r>
+            <a:endParaRPr kumimoji="1" lang="ja-JP" altLang="en-US" dirty="0">
+              <a:solidFill>
+                <a:schemeClr val="tx1"/>
+              </a:solidFill>
+            </a:endParaRPr>
+          </a:p>
+        </p:txBody>
+      </p:sp>
+      <p:sp>
+        <p:nvSpPr>
+          <p:cNvPr id="6" name="フローチャート: 処理 5">
+            <a:extLst>
+              <a:ext uri="{FF2B5EF4-FFF2-40B4-BE49-F238E27FC236}">
+                <a16:creationId xmlns:a16="http://schemas.microsoft.com/office/drawing/2014/main" id="{FA79313A-916D-5C5A-D231-06028E7863A4}"/>
+              </a:ext>
+            </a:extLst>
+          </p:cNvPr>
+          <p:cNvSpPr/>
+          <p:nvPr/>
+        </p:nvSpPr>
+        <p:spPr>
+          <a:xfrm>
+            <a:off x="3734604" y="6488668"/>
+            <a:ext cx="1326684" cy="369332"/>
+          </a:xfrm>
+          <a:prstGeom prst="flowChartProcess">
+            <a:avLst/>
+          </a:prstGeom>
+          <a:noFill/>
+          <a:ln>
+            <a:solidFill>
+              <a:schemeClr val="tx1"/>
+            </a:solidFill>
+          </a:ln>
+        </p:spPr>
+        <p:style>
+          <a:lnRef idx="2">
+            <a:schemeClr val="accent1">
+              <a:shade val="15000"/>
+            </a:schemeClr>
+          </a:lnRef>
+          <a:fillRef idx="1">
+            <a:schemeClr val="accent1"/>
+          </a:fillRef>
+          <a:effectRef idx="0">
+            <a:schemeClr val="accent1"/>
+          </a:effectRef>
+          <a:fontRef idx="minor">
+            <a:schemeClr val="lt1"/>
+          </a:fontRef>
+        </p:style>
+        <p:txBody>
+          <a:bodyPr wrap="square" rtlCol="0" anchor="ctr">
+            <a:spAutoFit/>
+          </a:bodyPr>
+          <a:lstStyle/>
+          <a:p>
+            <a:pPr algn="ctr"/>
+            <a:r>
+              <a:rPr lang="en-US" altLang="ja-JP" dirty="0">
+                <a:solidFill>
+                  <a:schemeClr val="tx1"/>
+                </a:solidFill>
+              </a:rPr>
+              <a:t>5</a:t>
+            </a:r>
+            <a:r>
+              <a:rPr kumimoji="1" lang="en-US" altLang="ja-JP" dirty="0">
+                <a:solidFill>
+                  <a:schemeClr val="tx1"/>
+                </a:solidFill>
+              </a:rPr>
+              <a:t> (5)</a:t>
+            </a:r>
+            <a:endParaRPr kumimoji="1" lang="ja-JP" altLang="en-US" dirty="0">
+              <a:solidFill>
+                <a:schemeClr val="tx1"/>
+              </a:solidFill>
+            </a:endParaRPr>
+          </a:p>
+        </p:txBody>
+      </p:sp>
+      <p:sp>
+        <p:nvSpPr>
+          <p:cNvPr id="7" name="フローチャート: 処理 6">
+            <a:extLst>
+              <a:ext uri="{FF2B5EF4-FFF2-40B4-BE49-F238E27FC236}">
+                <a16:creationId xmlns:a16="http://schemas.microsoft.com/office/drawing/2014/main" id="{7CB24545-369D-D025-466C-19A4FA2B098C}"/>
+              </a:ext>
+            </a:extLst>
+          </p:cNvPr>
+          <p:cNvSpPr/>
+          <p:nvPr/>
+        </p:nvSpPr>
+        <p:spPr>
+          <a:xfrm>
+            <a:off x="5601906" y="6488668"/>
+            <a:ext cx="1326684" cy="369332"/>
+          </a:xfrm>
+          <a:prstGeom prst="flowChartProcess">
+            <a:avLst/>
+          </a:prstGeom>
+          <a:noFill/>
+          <a:ln>
+            <a:solidFill>
+              <a:schemeClr val="tx1"/>
+            </a:solidFill>
+          </a:ln>
+        </p:spPr>
+        <p:style>
+          <a:lnRef idx="2">
+            <a:schemeClr val="accent1">
+              <a:shade val="15000"/>
+            </a:schemeClr>
+          </a:lnRef>
+          <a:fillRef idx="1">
+            <a:schemeClr val="accent1"/>
+          </a:fillRef>
+          <a:effectRef idx="0">
+            <a:schemeClr val="accent1"/>
+          </a:effectRef>
+          <a:fontRef idx="minor">
+            <a:schemeClr val="lt1"/>
+          </a:fontRef>
+        </p:style>
+        <p:txBody>
+          <a:bodyPr wrap="square" rtlCol="0" anchor="ctr">
+            <a:spAutoFit/>
+          </a:bodyPr>
+          <a:lstStyle/>
+          <a:p>
+            <a:pPr algn="ctr"/>
+            <a:r>
+              <a:rPr kumimoji="1" lang="en-US" altLang="ja-JP" dirty="0">
+                <a:solidFill>
+                  <a:schemeClr val="tx1"/>
+                </a:solidFill>
+              </a:rPr>
+              <a:t>2 (6)</a:t>
+            </a:r>
+            <a:endParaRPr kumimoji="1" lang="ja-JP" altLang="en-US" dirty="0">
+              <a:solidFill>
+                <a:schemeClr val="tx1"/>
+              </a:solidFill>
+            </a:endParaRPr>
+          </a:p>
+        </p:txBody>
+      </p:sp>
+      <p:sp>
+        <p:nvSpPr>
+          <p:cNvPr id="8" name="フローチャート: 処理 7">
+            <a:extLst>
+              <a:ext uri="{FF2B5EF4-FFF2-40B4-BE49-F238E27FC236}">
+                <a16:creationId xmlns:a16="http://schemas.microsoft.com/office/drawing/2014/main" id="{859C0E32-0B6C-7F73-2822-89D17252D49C}"/>
+              </a:ext>
+            </a:extLst>
+          </p:cNvPr>
+          <p:cNvSpPr/>
+          <p:nvPr/>
+        </p:nvSpPr>
+        <p:spPr>
+          <a:xfrm>
+            <a:off x="7255044" y="6488668"/>
+            <a:ext cx="1326684" cy="369332"/>
+          </a:xfrm>
+          <a:prstGeom prst="flowChartProcess">
+            <a:avLst/>
+          </a:prstGeom>
+          <a:noFill/>
+          <a:ln>
+            <a:solidFill>
+              <a:schemeClr val="tx1"/>
+            </a:solidFill>
+          </a:ln>
+        </p:spPr>
+        <p:style>
+          <a:lnRef idx="2">
+            <a:schemeClr val="accent1">
+              <a:shade val="15000"/>
+            </a:schemeClr>
+          </a:lnRef>
+          <a:fillRef idx="1">
+            <a:schemeClr val="accent1"/>
+          </a:fillRef>
+          <a:effectRef idx="0">
+            <a:schemeClr val="accent1"/>
+          </a:effectRef>
+          <a:fontRef idx="minor">
+            <a:schemeClr val="lt1"/>
+          </a:fontRef>
+        </p:style>
+        <p:txBody>
+          <a:bodyPr wrap="square" rtlCol="0" anchor="ctr">
+            <a:spAutoFit/>
+          </a:bodyPr>
+          <a:lstStyle/>
+          <a:p>
+            <a:pPr algn="ctr"/>
+            <a:r>
+              <a:rPr kumimoji="1" lang="en-US" altLang="ja-JP" dirty="0">
+                <a:solidFill>
+                  <a:schemeClr val="tx1"/>
+                </a:solidFill>
+              </a:rPr>
+              <a:t>6 (20)</a:t>
+            </a:r>
+            <a:endParaRPr kumimoji="1" lang="ja-JP" altLang="en-US" dirty="0">
+              <a:solidFill>
+                <a:schemeClr val="tx1"/>
+              </a:solidFill>
+            </a:endParaRPr>
+          </a:p>
+        </p:txBody>
+      </p:sp>
+      <p:sp>
+        <p:nvSpPr>
+          <p:cNvPr id="9" name="フローチャート: 処理 8">
+            <a:extLst>
+              <a:ext uri="{FF2B5EF4-FFF2-40B4-BE49-F238E27FC236}">
+                <a16:creationId xmlns:a16="http://schemas.microsoft.com/office/drawing/2014/main" id="{22413ADA-5378-46EC-67D8-FAE33A1872F0}"/>
+              </a:ext>
+            </a:extLst>
+          </p:cNvPr>
+          <p:cNvSpPr/>
+          <p:nvPr/>
+        </p:nvSpPr>
+        <p:spPr>
+          <a:xfrm>
+            <a:off x="9053364" y="6488668"/>
+            <a:ext cx="1326684" cy="369332"/>
+          </a:xfrm>
+          <a:prstGeom prst="flowChartProcess">
+            <a:avLst/>
+          </a:prstGeom>
+          <a:noFill/>
+          <a:ln>
+            <a:solidFill>
+              <a:schemeClr val="tx1"/>
+            </a:solidFill>
+          </a:ln>
+        </p:spPr>
+        <p:style>
+          <a:lnRef idx="2">
+            <a:schemeClr val="accent1">
+              <a:shade val="15000"/>
+            </a:schemeClr>
+          </a:lnRef>
+          <a:fillRef idx="1">
+            <a:schemeClr val="accent1"/>
+          </a:fillRef>
+          <a:effectRef idx="0">
+            <a:schemeClr val="accent1"/>
+          </a:effectRef>
+          <a:fontRef idx="minor">
+            <a:schemeClr val="lt1"/>
+          </a:fontRef>
+        </p:style>
+        <p:txBody>
+          <a:bodyPr wrap="square" rtlCol="0" anchor="ctr">
+            <a:spAutoFit/>
+          </a:bodyPr>
+          <a:lstStyle/>
+          <a:p>
+            <a:pPr algn="ctr"/>
+            <a:r>
+              <a:rPr kumimoji="1" lang="en-US" altLang="ja-JP" dirty="0">
+                <a:solidFill>
+                  <a:schemeClr val="tx1"/>
+                </a:solidFill>
+              </a:rPr>
+              <a:t>0(30)</a:t>
+            </a:r>
+            <a:endParaRPr kumimoji="1" lang="ja-JP" altLang="en-US" dirty="0">
+              <a:solidFill>
+                <a:schemeClr val="tx1"/>
+              </a:solidFill>
+            </a:endParaRPr>
+          </a:p>
+        </p:txBody>
+      </p:sp>
+      <p:sp>
+        <p:nvSpPr>
+          <p:cNvPr id="10" name="フローチャート: 処理 9">
+            <a:extLst>
+              <a:ext uri="{FF2B5EF4-FFF2-40B4-BE49-F238E27FC236}">
+                <a16:creationId xmlns:a16="http://schemas.microsoft.com/office/drawing/2014/main" id="{34051DAE-25DD-9D44-05F5-B55FF132B157}"/>
+              </a:ext>
+            </a:extLst>
+          </p:cNvPr>
+          <p:cNvSpPr/>
+          <p:nvPr/>
+        </p:nvSpPr>
+        <p:spPr>
+          <a:xfrm>
+            <a:off x="10851684" y="6488668"/>
+            <a:ext cx="1326684" cy="369332"/>
+          </a:xfrm>
+          <a:prstGeom prst="flowChartProcess">
+            <a:avLst/>
+          </a:prstGeom>
+          <a:noFill/>
+          <a:ln>
+            <a:solidFill>
+              <a:schemeClr val="tx1"/>
+            </a:solidFill>
+          </a:ln>
+        </p:spPr>
+        <p:style>
+          <a:lnRef idx="2">
+            <a:schemeClr val="accent1">
+              <a:shade val="15000"/>
+            </a:schemeClr>
+          </a:lnRef>
+          <a:fillRef idx="1">
+            <a:schemeClr val="accent1"/>
+          </a:fillRef>
+          <a:effectRef idx="0">
+            <a:schemeClr val="accent1"/>
+          </a:effectRef>
+          <a:fontRef idx="minor">
+            <a:schemeClr val="lt1"/>
+          </a:fontRef>
+        </p:style>
+        <p:txBody>
+          <a:bodyPr wrap="square" rtlCol="0" anchor="ctr">
+            <a:spAutoFit/>
+          </a:bodyPr>
+          <a:lstStyle/>
+          <a:p>
+            <a:pPr algn="ctr"/>
+            <a:r>
+              <a:rPr kumimoji="1" lang="en-US" altLang="ja-JP" dirty="0">
+                <a:solidFill>
+                  <a:schemeClr val="tx1"/>
+                </a:solidFill>
+              </a:rPr>
+              <a:t>7(32)</a:t>
+            </a:r>
+            <a:endParaRPr kumimoji="1" lang="ja-JP" altLang="en-US" dirty="0">
+              <a:solidFill>
+                <a:schemeClr val="tx1"/>
+              </a:solidFill>
+            </a:endParaRPr>
+          </a:p>
+        </p:txBody>
+      </p:sp>
+    </p:spTree>
+    <p:extLst>
+      <p:ext uri="{BB962C8B-B14F-4D97-AF65-F5344CB8AC3E}">
+        <p14:creationId xmlns:p14="http://schemas.microsoft.com/office/powerpoint/2010/main" val="4161399289"/>
+      </p:ext>
+    </p:extLst>
+  </p:cSld>
+  <p:clrMapOvr>
+    <a:masterClrMapping/>
+  </p:clrMapOvr>
+</p:sld>
+</file>
+
 <file path=ppt/theme/theme1.xml><?xml version="1.0" encoding="utf-8"?>
 <a:theme xmlns:a="http://schemas.openxmlformats.org/drawingml/2006/main" name="Office テーマ">
   <a:themeElements>
@@ -38802,110 +39369,16 @@
         <a:srgbClr val="96607D"/>
       </a:folHlink>
     </a:clrScheme>
-    <a:fontScheme name="Office">
+    <a:fontScheme name="メイリオ1">
       <a:majorFont>
-        <a:latin typeface="游ゴシック Light" panose="02110004020202020204"/>
-        <a:ea typeface=""/>
+        <a:latin typeface="Meiryo UI"/>
+        <a:ea typeface="メイリオ"/>
         <a:cs typeface=""/>
-        <a:font script="Jpan" typeface="游ゴシック Light"/>
-        <a:font script="Hang" typeface="맑은 고딕"/>
-        <a:font script="Hans" typeface="等线 Light"/>
-        <a:font script="Hant" typeface="新細明體"/>
-        <a:font script="Arab" typeface="Times New Roman"/>
-        <a:font script="Hebr" typeface="Times New Roman"/>
-        <a:font script="Thai" typeface="Angsana New"/>
-        <a:font script="Ethi" typeface="Nyala"/>
-        <a:font script="Beng" typeface="Vrinda"/>
-        <a:font script="Gujr" typeface="Shruti"/>
-        <a:font script="Khmr" typeface="MoolBoran"/>
-        <a:font script="Knda" typeface="Tunga"/>
-        <a:font script="Guru" typeface="Raavi"/>
-        <a:font script="Cans" typeface="Euphemia"/>
-        <a:font script="Cher" typeface="Plantagenet Cherokee"/>
-        <a:font script="Yiii" typeface="Microsoft Yi Baiti"/>
-        <a:font script="Tibt" typeface="Microsoft Himalaya"/>
-        <a:font script="Thaa" typeface="MV Boli"/>
-        <a:font script="Deva" typeface="Mangal"/>
-        <a:font script="Telu" typeface="Gautami"/>
-        <a:font script="Taml" typeface="Latha"/>
-        <a:font script="Syrc" typeface="Estrangelo Edessa"/>
-        <a:font script="Orya" typeface="Kalinga"/>
-        <a:font script="Mlym" typeface="Kartika"/>
-        <a:font script="Laoo" typeface="DokChampa"/>
-        <a:font script="Sinh" typeface="Iskoola Pota"/>
-        <a:font script="Mong" typeface="Mongolian Baiti"/>
-        <a:font script="Viet" typeface="Times New Roman"/>
-        <a:font script="Uigh" typeface="Microsoft Uighur"/>
-        <a:font script="Geor" typeface="Sylfaen"/>
-        <a:font script="Armn" typeface="Arial"/>
-        <a:font script="Bugi" typeface="Leelawadee UI"/>
-        <a:font script="Bopo" typeface="Microsoft JhengHei"/>
-        <a:font script="Java" typeface="Javanese Text"/>
-        <a:font script="Lisu" typeface="Segoe UI"/>
-        <a:font script="Mymr" typeface="Myanmar Text"/>
-        <a:font script="Nkoo" typeface="Ebrima"/>
-        <a:font script="Olck" typeface="Nirmala UI"/>
-        <a:font script="Osma" typeface="Ebrima"/>
-        <a:font script="Phag" typeface="Phagspa"/>
-        <a:font script="Syrn" typeface="Estrangelo Edessa"/>
-        <a:font script="Syrj" typeface="Estrangelo Edessa"/>
-        <a:font script="Syre" typeface="Estrangelo Edessa"/>
-        <a:font script="Sora" typeface="Nirmala UI"/>
-        <a:font script="Tale" typeface="Microsoft Tai Le"/>
-        <a:font script="Talu" typeface="Microsoft New Tai Lue"/>
-        <a:font script="Tfng" typeface="Ebrima"/>
       </a:majorFont>
       <a:minorFont>
-        <a:latin typeface="游ゴシック" panose="02110004020202020204"/>
-        <a:ea typeface=""/>
+        <a:latin typeface="Meiryo UI"/>
+        <a:ea typeface="メイリオ"/>
         <a:cs typeface=""/>
-        <a:font script="Jpan" typeface="游ゴシック"/>
-        <a:font script="Hang" typeface="맑은 고딕"/>
-        <a:font script="Hans" typeface="等线"/>
-        <a:font script="Hant" typeface="新細明體"/>
-        <a:font script="Arab" typeface="Arial"/>
-        <a:font script="Hebr" typeface="Arial"/>
-        <a:font script="Thai" typeface="Cordia New"/>
-        <a:font script="Ethi" typeface="Nyala"/>
-        <a:font script="Beng" typeface="Vrinda"/>
-        <a:font script="Gujr" typeface="Shruti"/>
-        <a:font script="Khmr" typeface="DaunPenh"/>
-        <a:font script="Knda" typeface="Tunga"/>
-        <a:font script="Guru" typeface="Raavi"/>
-        <a:font script="Cans" typeface="Euphemia"/>
-        <a:font script="Cher" typeface="Plantagenet Cherokee"/>
-        <a:font script="Yiii" typeface="Microsoft Yi Baiti"/>
-        <a:font script="Tibt" typeface="Microsoft Himalaya"/>
-        <a:font script="Thaa" typeface="MV Boli"/>
-        <a:font script="Deva" typeface="Mangal"/>
-        <a:font script="Telu" typeface="Gautami"/>
-        <a:font script="Taml" typeface="Latha"/>
-        <a:font script="Syrc" typeface="Estrangelo Edessa"/>
-        <a:font script="Orya" typeface="Kalinga"/>
-        <a:font script="Mlym" typeface="Kartika"/>
-        <a:font script="Laoo" typeface="DokChampa"/>
-        <a:font script="Sinh" typeface="Iskoola Pota"/>
-        <a:font script="Mong" typeface="Mongolian Baiti"/>
-        <a:font script="Viet" typeface="Arial"/>
-        <a:font script="Uigh" typeface="Microsoft Uighur"/>
-        <a:font script="Geor" typeface="Sylfaen"/>
-        <a:font script="Armn" typeface="Arial"/>
-        <a:font script="Bugi" typeface="Leelawadee UI"/>
-        <a:font script="Bopo" typeface="Microsoft JhengHei"/>
-        <a:font script="Java" typeface="Javanese Text"/>
-        <a:font script="Lisu" typeface="Segoe UI"/>
-        <a:font script="Mymr" typeface="Myanmar Text"/>
-        <a:font script="Nkoo" typeface="Ebrima"/>
-        <a:font script="Olck" typeface="Nirmala UI"/>
-        <a:font script="Osma" typeface="Ebrima"/>
-        <a:font script="Phag" typeface="Phagspa"/>
-        <a:font script="Syrn" typeface="Estrangelo Edessa"/>
-        <a:font script="Syrj" typeface="Estrangelo Edessa"/>
-        <a:font script="Syre" typeface="Estrangelo Edessa"/>
-        <a:font script="Sora" typeface="Nirmala UI"/>
-        <a:font script="Tale" typeface="Microsoft Tai Le"/>
-        <a:font script="Talu" typeface="Microsoft New Tai Lue"/>
-        <a:font script="Tfng" typeface="Ebrima"/>
       </a:minorFont>
     </a:fontScheme>
     <a:fmtScheme name="Office">
@@ -39077,27 +39550,6 @@
 </file>
 
 <file path=customXml/item1.xml><?xml version="1.0" encoding="utf-8"?>
-<p:properties xmlns:p="http://schemas.microsoft.com/office/2006/metadata/properties" xmlns:xsi="http://www.w3.org/2001/XMLSchema-instance" xmlns:pc="http://schemas.microsoft.com/office/infopath/2007/PartnerControls">
-  <documentManagement>
-    <lcf76f155ced4ddcb4097134ff3c332f xmlns="3f2448f0-14ff-44a0-b9f0-4068ebc6948c">
-      <Terms xmlns="http://schemas.microsoft.com/office/infopath/2007/PartnerControls"/>
-    </lcf76f155ced4ddcb4097134ff3c332f>
-    <ReferenceId xmlns="3f2448f0-14ff-44a0-b9f0-4068ebc6948c" xsi:nil="true"/>
-    <TaxCatchAll xmlns="1691ff36-5102-43ab-90dc-be7332a26000" xsi:nil="true"/>
-  </documentManagement>
-</p:properties>
-</file>
-
-<file path=customXml/item2.xml><?xml version="1.0" encoding="utf-8"?>
-<?mso-contentType ?>
-<FormTemplates xmlns="http://schemas.microsoft.com/sharepoint/v3/contenttype/forms">
-  <Display>DocumentLibraryForm</Display>
-  <Edit>DocumentLibraryForm</Edit>
-  <New>DocumentLibraryForm</New>
-</FormTemplates>
-</file>
-
-<file path=customXml/item3.xml><?xml version="1.0" encoding="utf-8"?>
 <ct:contentTypeSchema xmlns:ct="http://schemas.microsoft.com/office/2006/metadata/contentType" xmlns:ma="http://schemas.microsoft.com/office/2006/metadata/properties/metaAttributes" ct:_="" ma:_="" ma:contentTypeName="ドキュメント" ma:contentTypeID="0x01010012A8FAE802F5BE4999A49041993971E7" ma:contentTypeVersion="10" ma:contentTypeDescription="新しいドキュメントを作成します。" ma:contentTypeScope="" ma:versionID="b8d8008d18811c26c3a6f8049ae03944">
   <xsd:schema xmlns:xsd="http://www.w3.org/2001/XMLSchema" xmlns:xs="http://www.w3.org/2001/XMLSchema" xmlns:p="http://schemas.microsoft.com/office/2006/metadata/properties" xmlns:ns2="3f2448f0-14ff-44a0-b9f0-4068ebc6948c" xmlns:ns3="1691ff36-5102-43ab-90dc-be7332a26000" targetNamespace="http://schemas.microsoft.com/office/2006/metadata/properties" ma:root="true" ma:fieldsID="49021ec845088350abe83c917dd2c192" ns2:_="" ns3:_="">
     <xsd:import namespace="3f2448f0-14ff-44a0-b9f0-4068ebc6948c"/>
@@ -39284,26 +39736,28 @@
 </ct:contentTypeSchema>
 </file>
 
-<file path=customXml/itemProps1.xml><?xml version="1.0" encoding="utf-8"?>
-<ds:datastoreItem xmlns:ds="http://schemas.openxmlformats.org/officeDocument/2006/customXml" ds:itemID="{92E9D122-6294-4C98-8055-3EF5A84406A5}">
-  <ds:schemaRefs>
-    <ds:schemaRef ds:uri="http://schemas.microsoft.com/office/2006/metadata/properties"/>
-    <ds:schemaRef ds:uri="http://schemas.microsoft.com/office/infopath/2007/PartnerControls"/>
-    <ds:schemaRef ds:uri="3f2448f0-14ff-44a0-b9f0-4068ebc6948c"/>
-    <ds:schemaRef ds:uri="1691ff36-5102-43ab-90dc-be7332a26000"/>
-  </ds:schemaRefs>
-</ds:datastoreItem>
+<file path=customXml/item2.xml><?xml version="1.0" encoding="utf-8"?>
+<?mso-contentType ?>
+<FormTemplates xmlns="http://schemas.microsoft.com/sharepoint/v3/contenttype/forms">
+  <Display>DocumentLibraryForm</Display>
+  <Edit>DocumentLibraryForm</Edit>
+  <New>DocumentLibraryForm</New>
+</FormTemplates>
 </file>
 
-<file path=customXml/itemProps2.xml><?xml version="1.0" encoding="utf-8"?>
-<ds:datastoreItem xmlns:ds="http://schemas.openxmlformats.org/officeDocument/2006/customXml" ds:itemID="{8A037423-8182-4EC4-8D9B-3F10AB7069D4}">
-  <ds:schemaRefs>
-    <ds:schemaRef ds:uri="http://schemas.microsoft.com/sharepoint/v3/contenttype/forms"/>
-  </ds:schemaRefs>
-</ds:datastoreItem>
+<file path=customXml/item3.xml><?xml version="1.0" encoding="utf-8"?>
+<p:properties xmlns:p="http://schemas.microsoft.com/office/2006/metadata/properties" xmlns:xsi="http://www.w3.org/2001/XMLSchema-instance" xmlns:pc="http://schemas.microsoft.com/office/infopath/2007/PartnerControls">
+  <documentManagement>
+    <lcf76f155ced4ddcb4097134ff3c332f xmlns="3f2448f0-14ff-44a0-b9f0-4068ebc6948c">
+      <Terms xmlns="http://schemas.microsoft.com/office/infopath/2007/PartnerControls"/>
+    </lcf76f155ced4ddcb4097134ff3c332f>
+    <ReferenceId xmlns="3f2448f0-14ff-44a0-b9f0-4068ebc6948c" xsi:nil="true"/>
+    <TaxCatchAll xmlns="1691ff36-5102-43ab-90dc-be7332a26000" xsi:nil="true"/>
+  </documentManagement>
+</p:properties>
 </file>
 
-<file path=customXml/itemProps3.xml><?xml version="1.0" encoding="utf-8"?>
+<file path=customXml/itemProps1.xml><?xml version="1.0" encoding="utf-8"?>
 <ds:datastoreItem xmlns:ds="http://schemas.openxmlformats.org/officeDocument/2006/customXml" ds:itemID="{B7930F59-09B9-4A63-ADDE-F274E87DD4B5}">
   <ds:schemaRefs>
     <ds:schemaRef ds:uri="http://schemas.microsoft.com/office/2006/metadata/contentType"/>
@@ -39320,4 +39774,23 @@
     <ds:schemaRef ds:uri="http://schemas.microsoft.com/internal/obd"/>
   </ds:schemaRefs>
 </ds:datastoreItem>
+</file>
+
+<file path=customXml/itemProps2.xml><?xml version="1.0" encoding="utf-8"?>
+<ds:datastoreItem xmlns:ds="http://schemas.openxmlformats.org/officeDocument/2006/customXml" ds:itemID="{8A037423-8182-4EC4-8D9B-3F10AB7069D4}">
+  <ds:schemaRefs>
+    <ds:schemaRef ds:uri="http://schemas.microsoft.com/sharepoint/v3/contenttype/forms"/>
+  </ds:schemaRefs>
+</ds:datastoreItem>
+</file>
+
+<file path=customXml/itemProps3.xml><?xml version="1.0" encoding="utf-8"?>
+<ds:datastoreItem xmlns:ds="http://schemas.openxmlformats.org/officeDocument/2006/customXml" ds:itemID="{92E9D122-6294-4C98-8055-3EF5A84406A5}">
+  <ds:schemaRefs>
+    <ds:schemaRef ds:uri="http://schemas.microsoft.com/office/2006/metadata/properties"/>
+    <ds:schemaRef ds:uri="http://schemas.microsoft.com/office/infopath/2007/PartnerControls"/>
+    <ds:schemaRef ds:uri="3f2448f0-14ff-44a0-b9f0-4068ebc6948c"/>
+    <ds:schemaRef ds:uri="1691ff36-5102-43ab-90dc-be7332a26000"/>
+  </ds:schemaRefs>
+</ds:datastoreItem>
 </file>
</xml_diff>